<commit_message>
more changes to presentation
</commit_message>
<xml_diff>
--- a/XNA workshop.pptx
+++ b/XNA workshop.pptx
@@ -26663,8 +26663,12 @@
               <a:buNone/>
             </a:pPr>
             <a:r>
+              <a:rPr lang="en-IE" smtClean="0"/>
+              <a:t>Transform </a:t>
+            </a:r>
+            <a:r>
               <a:rPr lang="en-IE" dirty="0"/>
-              <a:t>Transform = </a:t>
+              <a:t>= </a:t>
             </a:r>
             <a:r>
               <a:rPr lang="en-IE" dirty="0" err="1"/>
@@ -26679,12 +26683,16 @@
               <a:t>position.X</a:t>
             </a:r>
             <a:r>
-              <a:rPr lang="en-IE"/>
+              <a:rPr lang="en-IE" dirty="0"/>
               <a:t>, </a:t>
             </a:r>
             <a:r>
-              <a:rPr lang="en-IE" smtClean="0"/>
-              <a:t>-position.Y</a:t>
+              <a:rPr lang="en-IE" dirty="0" smtClean="0"/>
+              <a:t>-</a:t>
+            </a:r>
+            <a:r>
+              <a:rPr lang="en-IE" dirty="0" err="1" smtClean="0"/>
+              <a:t>position.Y</a:t>
             </a:r>
             <a:r>
               <a:rPr lang="en-IE" dirty="0"/>

</xml_diff>